<commit_message>
view 	modified:   desktop_app/management_dashboard/interface_prototype.pptx 	modified:   desktop_app/management_dashboard/management_dashboard.pde 	modified:   desktop_app/management_dashboard/view.pde
</commit_message>
<xml_diff>
--- a/desktop_app/management_dashboard/interface_prototype.pptx
+++ b/desktop_app/management_dashboard/interface_prototype.pptx
@@ -115,6 +115,74 @@
 </p:presentation>
 </file>
 
+<file path=ppt/revisionInfo.xml><?xml version="1.0" encoding="utf-8"?>
+<p1510:revInfo xmlns:a="http://schemas.openxmlformats.org/drawingml/2006/main" xmlns:r="http://schemas.openxmlformats.org/officeDocument/2006/relationships" xmlns:p1510="http://schemas.microsoft.com/office/powerpoint/2015/10/main">
+  <p1510:revLst>
+    <p1510:client id="{2D3360E4-A659-7247-A025-95E16156561D}" v="1" dt="2020-04-11T11:01:12.075"/>
+  </p1510:revLst>
+</p1510:revInfo>
+</file>
+
+<file path=ppt/changesInfos/changesInfo1.xml><?xml version="1.0" encoding="utf-8"?>
+<pc:chgInfo xmlns:a="http://schemas.openxmlformats.org/drawingml/2006/main" xmlns:r="http://schemas.openxmlformats.org/officeDocument/2006/relationships" xmlns:ac="http://schemas.microsoft.com/office/drawing/2013/main/command" xmlns:pc="http://schemas.microsoft.com/office/powerpoint/2013/main/command">
+  <pc:docChgLst>
+    <pc:chgData name="杨 一楠" userId="da2026d27b215a28" providerId="LiveId" clId="{2D3360E4-A659-7247-A025-95E16156561D}"/>
+    <pc:docChg chg="custSel modSld">
+      <pc:chgData name="杨 一楠" userId="da2026d27b215a28" providerId="LiveId" clId="{2D3360E4-A659-7247-A025-95E16156561D}" dt="2020-04-11T11:01:35.048" v="20" actId="478"/>
+      <pc:docMkLst>
+        <pc:docMk/>
+      </pc:docMkLst>
+      <pc:sldChg chg="addSp delSp modSp">
+        <pc:chgData name="杨 一楠" userId="da2026d27b215a28" providerId="LiveId" clId="{2D3360E4-A659-7247-A025-95E16156561D}" dt="2020-04-11T11:01:35.048" v="20" actId="478"/>
+        <pc:sldMkLst>
+          <pc:docMk/>
+          <pc:sldMk cId="2999099738" sldId="256"/>
+        </pc:sldMkLst>
+        <pc:spChg chg="add del mod">
+          <ac:chgData name="杨 一楠" userId="da2026d27b215a28" providerId="LiveId" clId="{2D3360E4-A659-7247-A025-95E16156561D}" dt="2020-04-11T11:01:35.048" v="20" actId="478"/>
+          <ac:spMkLst>
+            <pc:docMk/>
+            <pc:sldMk cId="2999099738" sldId="256"/>
+            <ac:spMk id="36" creationId="{BA7D2982-C6E0-D54B-AB70-DBED8AB06161}"/>
+          </ac:spMkLst>
+        </pc:spChg>
+        <pc:grpChg chg="mod">
+          <ac:chgData name="杨 一楠" userId="da2026d27b215a28" providerId="LiveId" clId="{2D3360E4-A659-7247-A025-95E16156561D}" dt="2020-04-11T11:00:52.533" v="8" actId="1076"/>
+          <ac:grpSpMkLst>
+            <pc:docMk/>
+            <pc:sldMk cId="2999099738" sldId="256"/>
+            <ac:grpSpMk id="18" creationId="{AED54497-2838-470B-9967-D8C970AFFC8C}"/>
+          </ac:grpSpMkLst>
+        </pc:grpChg>
+      </pc:sldChg>
+      <pc:sldChg chg="modSp">
+        <pc:chgData name="杨 一楠" userId="da2026d27b215a28" providerId="LiveId" clId="{2D3360E4-A659-7247-A025-95E16156561D}" dt="2020-04-11T10:45:46.930" v="7" actId="1076"/>
+        <pc:sldMkLst>
+          <pc:docMk/>
+          <pc:sldMk cId="3973129482" sldId="258"/>
+        </pc:sldMkLst>
+        <pc:grpChg chg="mod">
+          <ac:chgData name="杨 一楠" userId="da2026d27b215a28" providerId="LiveId" clId="{2D3360E4-A659-7247-A025-95E16156561D}" dt="2020-04-11T08:57:08.826" v="6" actId="1036"/>
+          <ac:grpSpMkLst>
+            <pc:docMk/>
+            <pc:sldMk cId="3973129482" sldId="258"/>
+            <ac:grpSpMk id="18" creationId="{AED54497-2838-470B-9967-D8C970AFFC8C}"/>
+          </ac:grpSpMkLst>
+        </pc:grpChg>
+        <pc:picChg chg="mod">
+          <ac:chgData name="杨 一楠" userId="da2026d27b215a28" providerId="LiveId" clId="{2D3360E4-A659-7247-A025-95E16156561D}" dt="2020-04-11T10:45:46.930" v="7" actId="1076"/>
+          <ac:picMkLst>
+            <pc:docMk/>
+            <pc:sldMk cId="3973129482" sldId="258"/>
+            <ac:picMk id="11" creationId="{4616C44F-C7F5-46D6-8FED-AA35572040BD}"/>
+          </ac:picMkLst>
+        </pc:picChg>
+      </pc:sldChg>
+    </pc:docChg>
+  </pc:docChgLst>
+</pc:chgInfo>
+</file>
+
 <file path=ppt/charts/chart1.xml><?xml version="1.0" encoding="utf-8"?>
 <c:chartSpace xmlns:c="http://schemas.openxmlformats.org/drawingml/2006/chart" xmlns:a="http://schemas.openxmlformats.org/drawingml/2006/main" xmlns:r="http://schemas.openxmlformats.org/officeDocument/2006/relationships" xmlns:c16r2="http://schemas.microsoft.com/office/drawing/2015/06/chart">
   <c:date1904 val="0"/>
@@ -954,6 +1022,7 @@
         <c:minorTickMark val="none"/>
         <c:tickLblPos val="nextTo"/>
         <c:crossAx val="559383848"/>
+        <c:crosses val="autoZero"/>
         <c:auto val="1"/>
         <c:lblAlgn val="ctr"/>
         <c:lblOffset val="100"/>
@@ -1884,6 +1953,7 @@
         <c:minorTickMark val="none"/>
         <c:tickLblPos val="nextTo"/>
         <c:crossAx val="559383848"/>
+        <c:crosses val="autoZero"/>
         <c:auto val="1"/>
         <c:lblAlgn val="ctr"/>
         <c:lblOffset val="100"/>
@@ -2815,6 +2885,7 @@
         <c:minorTickMark val="none"/>
         <c:tickLblPos val="nextTo"/>
         <c:crossAx val="559383848"/>
+        <c:crosses val="autoZero"/>
         <c:auto val="1"/>
         <c:lblAlgn val="ctr"/>
         <c:lblOffset val="100"/>
@@ -6360,7 +6431,7 @@
           <a:p>
             <a:fld id="{0C9F309C-C2C7-4D12-B91F-304C479FCDAF}" type="datetimeFigureOut">
               <a:rPr lang="zh-CN" altLang="en-US" smtClean="0"/>
-              <a:t>2020/3/31</a:t>
+              <a:t>2020/4/11</a:t>
             </a:fld>
             <a:endParaRPr lang="zh-CN" altLang="en-US"/>
           </a:p>
@@ -6558,7 +6629,7 @@
           <a:p>
             <a:fld id="{0C9F309C-C2C7-4D12-B91F-304C479FCDAF}" type="datetimeFigureOut">
               <a:rPr lang="zh-CN" altLang="en-US" smtClean="0"/>
-              <a:t>2020/3/31</a:t>
+              <a:t>2020/4/11</a:t>
             </a:fld>
             <a:endParaRPr lang="zh-CN" altLang="en-US"/>
           </a:p>
@@ -6766,7 +6837,7 @@
           <a:p>
             <a:fld id="{0C9F309C-C2C7-4D12-B91F-304C479FCDAF}" type="datetimeFigureOut">
               <a:rPr lang="zh-CN" altLang="en-US" smtClean="0"/>
-              <a:t>2020/3/31</a:t>
+              <a:t>2020/4/11</a:t>
             </a:fld>
             <a:endParaRPr lang="zh-CN" altLang="en-US"/>
           </a:p>
@@ -6964,7 +7035,7 @@
           <a:p>
             <a:fld id="{0C9F309C-C2C7-4D12-B91F-304C479FCDAF}" type="datetimeFigureOut">
               <a:rPr lang="zh-CN" altLang="en-US" smtClean="0"/>
-              <a:t>2020/3/31</a:t>
+              <a:t>2020/4/11</a:t>
             </a:fld>
             <a:endParaRPr lang="zh-CN" altLang="en-US"/>
           </a:p>
@@ -7239,7 +7310,7 @@
           <a:p>
             <a:fld id="{0C9F309C-C2C7-4D12-B91F-304C479FCDAF}" type="datetimeFigureOut">
               <a:rPr lang="zh-CN" altLang="en-US" smtClean="0"/>
-              <a:t>2020/3/31</a:t>
+              <a:t>2020/4/11</a:t>
             </a:fld>
             <a:endParaRPr lang="zh-CN" altLang="en-US"/>
           </a:p>
@@ -7504,7 +7575,7 @@
           <a:p>
             <a:fld id="{0C9F309C-C2C7-4D12-B91F-304C479FCDAF}" type="datetimeFigureOut">
               <a:rPr lang="zh-CN" altLang="en-US" smtClean="0"/>
-              <a:t>2020/3/31</a:t>
+              <a:t>2020/4/11</a:t>
             </a:fld>
             <a:endParaRPr lang="zh-CN" altLang="en-US"/>
           </a:p>
@@ -7916,7 +7987,7 @@
           <a:p>
             <a:fld id="{0C9F309C-C2C7-4D12-B91F-304C479FCDAF}" type="datetimeFigureOut">
               <a:rPr lang="zh-CN" altLang="en-US" smtClean="0"/>
-              <a:t>2020/3/31</a:t>
+              <a:t>2020/4/11</a:t>
             </a:fld>
             <a:endParaRPr lang="zh-CN" altLang="en-US"/>
           </a:p>
@@ -8057,7 +8128,7 @@
           <a:p>
             <a:fld id="{0C9F309C-C2C7-4D12-B91F-304C479FCDAF}" type="datetimeFigureOut">
               <a:rPr lang="zh-CN" altLang="en-US" smtClean="0"/>
-              <a:t>2020/3/31</a:t>
+              <a:t>2020/4/11</a:t>
             </a:fld>
             <a:endParaRPr lang="zh-CN" altLang="en-US"/>
           </a:p>
@@ -8170,7 +8241,7 @@
           <a:p>
             <a:fld id="{0C9F309C-C2C7-4D12-B91F-304C479FCDAF}" type="datetimeFigureOut">
               <a:rPr lang="zh-CN" altLang="en-US" smtClean="0"/>
-              <a:t>2020/3/31</a:t>
+              <a:t>2020/4/11</a:t>
             </a:fld>
             <a:endParaRPr lang="zh-CN" altLang="en-US"/>
           </a:p>
@@ -8481,7 +8552,7 @@
           <a:p>
             <a:fld id="{0C9F309C-C2C7-4D12-B91F-304C479FCDAF}" type="datetimeFigureOut">
               <a:rPr lang="zh-CN" altLang="en-US" smtClean="0"/>
-              <a:t>2020/3/31</a:t>
+              <a:t>2020/4/11</a:t>
             </a:fld>
             <a:endParaRPr lang="zh-CN" altLang="en-US"/>
           </a:p>
@@ -8769,7 +8840,7 @@
           <a:p>
             <a:fld id="{0C9F309C-C2C7-4D12-B91F-304C479FCDAF}" type="datetimeFigureOut">
               <a:rPr lang="zh-CN" altLang="en-US" smtClean="0"/>
-              <a:t>2020/3/31</a:t>
+              <a:t>2020/4/11</a:t>
             </a:fld>
             <a:endParaRPr lang="zh-CN" altLang="en-US"/>
           </a:p>
@@ -9010,7 +9081,7 @@
           <a:p>
             <a:fld id="{0C9F309C-C2C7-4D12-B91F-304C479FCDAF}" type="datetimeFigureOut">
               <a:rPr lang="zh-CN" altLang="en-US" smtClean="0"/>
-              <a:t>2020/3/31</a:t>
+              <a:t>2020/4/11</a:t>
             </a:fld>
             <a:endParaRPr lang="zh-CN" altLang="en-US"/>
           </a:p>
@@ -9451,7 +9522,7 @@
         </p:nvGrpSpPr>
         <p:grpSpPr>
           <a:xfrm>
-            <a:off x="-1" y="74361"/>
+            <a:off x="-1" y="100084"/>
             <a:ext cx="12192001" cy="830997"/>
             <a:chOff x="-1" y="74361"/>
             <a:chExt cx="12192001" cy="830997"/>
@@ -10321,7 +10392,7 @@
                     <a:bodyPr/>
                     <a:lstStyle/>
                     <a:p>
-                      <a:endParaRPr lang="zh-CN" altLang="en-US" sz="1050"/>
+                      <a:endParaRPr lang="zh-CN" altLang="en-US" sz="1050" dirty="0"/>
                     </a:p>
                   </a:txBody>
                   <a:tcPr/>
@@ -10896,7 +10967,7 @@
                     <a:bodyPr/>
                     <a:lstStyle/>
                     <a:p>
-                      <a:endParaRPr lang="zh-CN" altLang="en-US" sz="1200"/>
+                      <a:endParaRPr lang="zh-CN" altLang="en-US" sz="1200" dirty="0"/>
                     </a:p>
                   </a:txBody>
                   <a:tcPr/>
@@ -10983,7 +11054,7 @@
                     <a:bodyPr/>
                     <a:lstStyle/>
                     <a:p>
-                      <a:endParaRPr lang="zh-CN" altLang="en-US" sz="1200"/>
+                      <a:endParaRPr lang="zh-CN" altLang="en-US" sz="1200" dirty="0"/>
                     </a:p>
                   </a:txBody>
                   <a:tcPr/>
@@ -12664,7 +12735,7 @@
         </p:nvGrpSpPr>
         <p:grpSpPr>
           <a:xfrm>
-            <a:off x="-1" y="74361"/>
+            <a:off x="-1" y="87061"/>
             <a:ext cx="12192001" cy="830997"/>
             <a:chOff x="-1" y="74361"/>
             <a:chExt cx="12192001" cy="830997"/>
@@ -13659,7 +13730,7 @@
                     <a:bodyPr/>
                     <a:lstStyle/>
                     <a:p>
-                      <a:endParaRPr lang="zh-CN" altLang="en-US" sz="1050"/>
+                      <a:endParaRPr lang="zh-CN" altLang="en-US" sz="1050" dirty="0"/>
                     </a:p>
                   </a:txBody>
                   <a:tcPr/>
@@ -14105,7 +14176,7 @@
                     <a:bodyPr/>
                     <a:lstStyle/>
                     <a:p>
-                      <a:endParaRPr lang="zh-CN" altLang="en-US" sz="1200"/>
+                      <a:endParaRPr lang="zh-CN" altLang="en-US" sz="1200" dirty="0"/>
                     </a:p>
                   </a:txBody>
                   <a:tcPr/>
@@ -15333,7 +15404,7 @@
         </p:blipFill>
         <p:spPr>
           <a:xfrm>
-            <a:off x="11667522" y="91091"/>
+            <a:off x="11688299" y="100227"/>
             <a:ext cx="415081" cy="415081"/>
           </a:xfrm>
           <a:prstGeom prst="rect">

</xml_diff>

<commit_message>
view:listbox timer label and image model  finish 	new file:   .gitignore 	new file:   desktop_app/management_dashboard/data/darkAccountIcon.png 	new file:   desktop_app/management_dashboard/data/darkSettingsIcon.png 	new file:   desktop_app/management_dashboard/data/lightAccountIcon.png 	new file:   desktop_app/management_dashboard/data/lightSettingsIcon.png 	modified:   desktop_app/management_dashboard/interface_prototype.pptx 	modified:   desktop_app/management_dashboard/management_dashboard.pde 	modified:   desktop_app/management_dashboard/view.pde
</commit_message>
<xml_diff>
--- a/desktop_app/management_dashboard/interface_prototype.pptx
+++ b/desktop_app/management_dashboard/interface_prototype.pptx
@@ -118,7 +118,7 @@
 <file path=ppt/revisionInfo.xml><?xml version="1.0" encoding="utf-8"?>
 <p1510:revInfo xmlns:a="http://schemas.openxmlformats.org/drawingml/2006/main" xmlns:r="http://schemas.openxmlformats.org/officeDocument/2006/relationships" xmlns:p1510="http://schemas.microsoft.com/office/powerpoint/2015/10/main">
   <p1510:revLst>
-    <p1510:client id="{2D3360E4-A659-7247-A025-95E16156561D}" v="1" dt="2020-04-11T11:01:12.075"/>
+    <p1510:client id="{2D3360E4-A659-7247-A025-95E16156561D}" v="5" dt="2020-04-14T02:18:25.791"/>
   </p1510:revLst>
 </p1510:revInfo>
 </file>
@@ -127,17 +127,33 @@
 <pc:chgInfo xmlns:a="http://schemas.openxmlformats.org/drawingml/2006/main" xmlns:r="http://schemas.openxmlformats.org/officeDocument/2006/relationships" xmlns:ac="http://schemas.microsoft.com/office/drawing/2013/main/command" xmlns:pc="http://schemas.microsoft.com/office/powerpoint/2013/main/command">
   <pc:docChgLst>
     <pc:chgData name="杨 一楠" userId="da2026d27b215a28" providerId="LiveId" clId="{2D3360E4-A659-7247-A025-95E16156561D}"/>
-    <pc:docChg chg="custSel modSld">
-      <pc:chgData name="杨 一楠" userId="da2026d27b215a28" providerId="LiveId" clId="{2D3360E4-A659-7247-A025-95E16156561D}" dt="2020-04-11T11:01:35.048" v="20" actId="478"/>
+    <pc:docChg chg="undo custSel modSld">
+      <pc:chgData name="杨 一楠" userId="da2026d27b215a28" providerId="LiveId" clId="{2D3360E4-A659-7247-A025-95E16156561D}" dt="2020-04-14T03:06:27.048" v="37" actId="1076"/>
       <pc:docMkLst>
         <pc:docMk/>
       </pc:docMkLst>
       <pc:sldChg chg="addSp delSp modSp">
-        <pc:chgData name="杨 一楠" userId="da2026d27b215a28" providerId="LiveId" clId="{2D3360E4-A659-7247-A025-95E16156561D}" dt="2020-04-11T11:01:35.048" v="20" actId="478"/>
+        <pc:chgData name="杨 一楠" userId="da2026d27b215a28" providerId="LiveId" clId="{2D3360E4-A659-7247-A025-95E16156561D}" dt="2020-04-14T03:06:27.048" v="37" actId="1076"/>
         <pc:sldMkLst>
           <pc:docMk/>
           <pc:sldMk cId="2999099738" sldId="256"/>
         </pc:sldMkLst>
+        <pc:spChg chg="mod">
+          <ac:chgData name="杨 一楠" userId="da2026d27b215a28" providerId="LiveId" clId="{2D3360E4-A659-7247-A025-95E16156561D}" dt="2020-04-14T02:19:32.023" v="34" actId="1076"/>
+          <ac:spMkLst>
+            <pc:docMk/>
+            <pc:sldMk cId="2999099738" sldId="256"/>
+            <ac:spMk id="13" creationId="{09B90EA1-61CA-4883-A04F-B3F075BD62A1}"/>
+          </ac:spMkLst>
+        </pc:spChg>
+        <pc:spChg chg="add mod">
+          <ac:chgData name="杨 一楠" userId="da2026d27b215a28" providerId="LiveId" clId="{2D3360E4-A659-7247-A025-95E16156561D}" dt="2020-04-14T02:18:25.791" v="28" actId="571"/>
+          <ac:spMkLst>
+            <pc:docMk/>
+            <pc:sldMk cId="2999099738" sldId="256"/>
+            <ac:spMk id="36" creationId="{2E609105-83CA-2244-90B6-36A7AFBA2E65}"/>
+          </ac:spMkLst>
+        </pc:spChg>
         <pc:spChg chg="add del mod">
           <ac:chgData name="杨 一楠" userId="da2026d27b215a28" providerId="LiveId" clId="{2D3360E4-A659-7247-A025-95E16156561D}" dt="2020-04-11T11:01:35.048" v="20" actId="478"/>
           <ac:spMkLst>
@@ -146,21 +162,45 @@
             <ac:spMk id="36" creationId="{BA7D2982-C6E0-D54B-AB70-DBED8AB06161}"/>
           </ac:spMkLst>
         </pc:spChg>
+        <pc:spChg chg="add mod">
+          <ac:chgData name="杨 一楠" userId="da2026d27b215a28" providerId="LiveId" clId="{2D3360E4-A659-7247-A025-95E16156561D}" dt="2020-04-14T02:18:23.789" v="27" actId="571"/>
+          <ac:spMkLst>
+            <pc:docMk/>
+            <pc:sldMk cId="2999099738" sldId="256"/>
+            <ac:spMk id="37" creationId="{F34055CB-6862-2D46-9393-A1C29541E08E}"/>
+          </ac:spMkLst>
+        </pc:spChg>
         <pc:grpChg chg="mod">
-          <ac:chgData name="杨 一楠" userId="da2026d27b215a28" providerId="LiveId" clId="{2D3360E4-A659-7247-A025-95E16156561D}" dt="2020-04-11T11:00:52.533" v="8" actId="1076"/>
+          <ac:chgData name="杨 一楠" userId="da2026d27b215a28" providerId="LiveId" clId="{2D3360E4-A659-7247-A025-95E16156561D}" dt="2020-04-14T03:06:27.048" v="37" actId="1076"/>
           <ac:grpSpMkLst>
             <pc:docMk/>
             <pc:sldMk cId="2999099738" sldId="256"/>
             <ac:grpSpMk id="18" creationId="{AED54497-2838-470B-9967-D8C970AFFC8C}"/>
           </ac:grpSpMkLst>
         </pc:grpChg>
+        <pc:picChg chg="mod">
+          <ac:chgData name="杨 一楠" userId="da2026d27b215a28" providerId="LiveId" clId="{2D3360E4-A659-7247-A025-95E16156561D}" dt="2020-04-14T02:19:31.348" v="33" actId="1076"/>
+          <ac:picMkLst>
+            <pc:docMk/>
+            <pc:sldMk cId="2999099738" sldId="256"/>
+            <ac:picMk id="12" creationId="{0D6B1649-3E53-4C8B-AC6C-BD4EF346A8BC}"/>
+          </ac:picMkLst>
+        </pc:picChg>
       </pc:sldChg>
       <pc:sldChg chg="modSp">
-        <pc:chgData name="杨 一楠" userId="da2026d27b215a28" providerId="LiveId" clId="{2D3360E4-A659-7247-A025-95E16156561D}" dt="2020-04-11T10:45:46.930" v="7" actId="1076"/>
+        <pc:chgData name="杨 一楠" userId="da2026d27b215a28" providerId="LiveId" clId="{2D3360E4-A659-7247-A025-95E16156561D}" dt="2020-04-14T02:19:54.250" v="36" actId="1076"/>
         <pc:sldMkLst>
           <pc:docMk/>
           <pc:sldMk cId="3973129482" sldId="258"/>
         </pc:sldMkLst>
+        <pc:spChg chg="mod">
+          <ac:chgData name="杨 一楠" userId="da2026d27b215a28" providerId="LiveId" clId="{2D3360E4-A659-7247-A025-95E16156561D}" dt="2020-04-14T02:19:54.250" v="36" actId="1076"/>
+          <ac:spMkLst>
+            <pc:docMk/>
+            <pc:sldMk cId="3973129482" sldId="258"/>
+            <ac:spMk id="13" creationId="{09B90EA1-61CA-4883-A04F-B3F075BD62A1}"/>
+          </ac:spMkLst>
+        </pc:spChg>
         <pc:grpChg chg="mod">
           <ac:chgData name="杨 一楠" userId="da2026d27b215a28" providerId="LiveId" clId="{2D3360E4-A659-7247-A025-95E16156561D}" dt="2020-04-11T08:57:08.826" v="6" actId="1036"/>
           <ac:grpSpMkLst>
@@ -6431,7 +6471,7 @@
           <a:p>
             <a:fld id="{0C9F309C-C2C7-4D12-B91F-304C479FCDAF}" type="datetimeFigureOut">
               <a:rPr lang="zh-CN" altLang="en-US" smtClean="0"/>
-              <a:t>2020/4/11</a:t>
+              <a:t>2020/4/14</a:t>
             </a:fld>
             <a:endParaRPr lang="zh-CN" altLang="en-US"/>
           </a:p>
@@ -6629,7 +6669,7 @@
           <a:p>
             <a:fld id="{0C9F309C-C2C7-4D12-B91F-304C479FCDAF}" type="datetimeFigureOut">
               <a:rPr lang="zh-CN" altLang="en-US" smtClean="0"/>
-              <a:t>2020/4/11</a:t>
+              <a:t>2020/4/14</a:t>
             </a:fld>
             <a:endParaRPr lang="zh-CN" altLang="en-US"/>
           </a:p>
@@ -6837,7 +6877,7 @@
           <a:p>
             <a:fld id="{0C9F309C-C2C7-4D12-B91F-304C479FCDAF}" type="datetimeFigureOut">
               <a:rPr lang="zh-CN" altLang="en-US" smtClean="0"/>
-              <a:t>2020/4/11</a:t>
+              <a:t>2020/4/14</a:t>
             </a:fld>
             <a:endParaRPr lang="zh-CN" altLang="en-US"/>
           </a:p>
@@ -7035,7 +7075,7 @@
           <a:p>
             <a:fld id="{0C9F309C-C2C7-4D12-B91F-304C479FCDAF}" type="datetimeFigureOut">
               <a:rPr lang="zh-CN" altLang="en-US" smtClean="0"/>
-              <a:t>2020/4/11</a:t>
+              <a:t>2020/4/14</a:t>
             </a:fld>
             <a:endParaRPr lang="zh-CN" altLang="en-US"/>
           </a:p>
@@ -7310,7 +7350,7 @@
           <a:p>
             <a:fld id="{0C9F309C-C2C7-4D12-B91F-304C479FCDAF}" type="datetimeFigureOut">
               <a:rPr lang="zh-CN" altLang="en-US" smtClean="0"/>
-              <a:t>2020/4/11</a:t>
+              <a:t>2020/4/14</a:t>
             </a:fld>
             <a:endParaRPr lang="zh-CN" altLang="en-US"/>
           </a:p>
@@ -7575,7 +7615,7 @@
           <a:p>
             <a:fld id="{0C9F309C-C2C7-4D12-B91F-304C479FCDAF}" type="datetimeFigureOut">
               <a:rPr lang="zh-CN" altLang="en-US" smtClean="0"/>
-              <a:t>2020/4/11</a:t>
+              <a:t>2020/4/14</a:t>
             </a:fld>
             <a:endParaRPr lang="zh-CN" altLang="en-US"/>
           </a:p>
@@ -7987,7 +8027,7 @@
           <a:p>
             <a:fld id="{0C9F309C-C2C7-4D12-B91F-304C479FCDAF}" type="datetimeFigureOut">
               <a:rPr lang="zh-CN" altLang="en-US" smtClean="0"/>
-              <a:t>2020/4/11</a:t>
+              <a:t>2020/4/14</a:t>
             </a:fld>
             <a:endParaRPr lang="zh-CN" altLang="en-US"/>
           </a:p>
@@ -8128,7 +8168,7 @@
           <a:p>
             <a:fld id="{0C9F309C-C2C7-4D12-B91F-304C479FCDAF}" type="datetimeFigureOut">
               <a:rPr lang="zh-CN" altLang="en-US" smtClean="0"/>
-              <a:t>2020/4/11</a:t>
+              <a:t>2020/4/14</a:t>
             </a:fld>
             <a:endParaRPr lang="zh-CN" altLang="en-US"/>
           </a:p>
@@ -8241,7 +8281,7 @@
           <a:p>
             <a:fld id="{0C9F309C-C2C7-4D12-B91F-304C479FCDAF}" type="datetimeFigureOut">
               <a:rPr lang="zh-CN" altLang="en-US" smtClean="0"/>
-              <a:t>2020/4/11</a:t>
+              <a:t>2020/4/14</a:t>
             </a:fld>
             <a:endParaRPr lang="zh-CN" altLang="en-US"/>
           </a:p>
@@ -8552,7 +8592,7 @@
           <a:p>
             <a:fld id="{0C9F309C-C2C7-4D12-B91F-304C479FCDAF}" type="datetimeFigureOut">
               <a:rPr lang="zh-CN" altLang="en-US" smtClean="0"/>
-              <a:t>2020/4/11</a:t>
+              <a:t>2020/4/14</a:t>
             </a:fld>
             <a:endParaRPr lang="zh-CN" altLang="en-US"/>
           </a:p>
@@ -8840,7 +8880,7 @@
           <a:p>
             <a:fld id="{0C9F309C-C2C7-4D12-B91F-304C479FCDAF}" type="datetimeFigureOut">
               <a:rPr lang="zh-CN" altLang="en-US" smtClean="0"/>
-              <a:t>2020/4/11</a:t>
+              <a:t>2020/4/14</a:t>
             </a:fld>
             <a:endParaRPr lang="zh-CN" altLang="en-US"/>
           </a:p>
@@ -9081,7 +9121,7 @@
           <a:p>
             <a:fld id="{0C9F309C-C2C7-4D12-B91F-304C479FCDAF}" type="datetimeFigureOut">
               <a:rPr lang="zh-CN" altLang="en-US" smtClean="0"/>
-              <a:t>2020/4/11</a:t>
+              <a:t>2020/4/14</a:t>
             </a:fld>
             <a:endParaRPr lang="zh-CN" altLang="en-US"/>
           </a:p>
@@ -9522,7 +9562,7 @@
         </p:nvGrpSpPr>
         <p:grpSpPr>
           <a:xfrm>
-            <a:off x="-1" y="100084"/>
+            <a:off x="-1" y="117427"/>
             <a:ext cx="12192001" cy="830997"/>
             <a:chOff x="-1" y="74361"/>
             <a:chExt cx="12192001" cy="830997"/>

</xml_diff>

<commit_message>
easy view finish 	modified:   desktop_app/management_dashboard/data/darkAccountIcon.png 	new file:   desktop_app/management_dashboard/data/darkCloseControl.png 	new file:   desktop_app/management_dashboard/data/darkCustomerAccount.png 	new file:   desktop_app/management_dashboard/data/darkLiftControl.png 	modified:   desktop_app/management_dashboard/data/darkSettingsIcon.png 	modified:   desktop_app/management_dashboard/data/lightAccountIcon.png 	new file:   desktop_app/management_dashboard/data/lightCloseControl.png 	new file:   desktop_app/management_dashboard/data/lightCustomerAccount.png 	new file:   desktop_app/management_dashboard/data/lightLiftControl.png 	modified:   desktop_app/management_dashboard/data/lightSettingsIcon.png 	modified:   desktop_app/management_dashboard/interface_prototype.pptx 	modified:   desktop_app/management_dashboard/management_dashboard.pde 	modified:   desktop_app/management_dashboard/view.pde
</commit_message>
<xml_diff>
--- a/desktop_app/management_dashboard/interface_prototype.pptx
+++ b/desktop_app/management_dashboard/interface_prototype.pptx
@@ -118,7 +118,7 @@
 <file path=ppt/revisionInfo.xml><?xml version="1.0" encoding="utf-8"?>
 <p1510:revInfo xmlns:a="http://schemas.openxmlformats.org/drawingml/2006/main" xmlns:r="http://schemas.openxmlformats.org/officeDocument/2006/relationships" xmlns:p1510="http://schemas.microsoft.com/office/powerpoint/2015/10/main">
   <p1510:revLst>
-    <p1510:client id="{2D3360E4-A659-7247-A025-95E16156561D}" v="5" dt="2020-04-14T02:18:25.791"/>
+    <p1510:client id="{2D3360E4-A659-7247-A025-95E16156561D}" v="6" dt="2020-04-14T08:00:54.015"/>
   </p1510:revLst>
 </p1510:revInfo>
 </file>
@@ -128,12 +128,12 @@
   <pc:docChgLst>
     <pc:chgData name="杨 一楠" userId="da2026d27b215a28" providerId="LiveId" clId="{2D3360E4-A659-7247-A025-95E16156561D}"/>
     <pc:docChg chg="undo custSel modSld">
-      <pc:chgData name="杨 一楠" userId="da2026d27b215a28" providerId="LiveId" clId="{2D3360E4-A659-7247-A025-95E16156561D}" dt="2020-04-14T03:06:27.048" v="37" actId="1076"/>
+      <pc:chgData name="杨 一楠" userId="da2026d27b215a28" providerId="LiveId" clId="{2D3360E4-A659-7247-A025-95E16156561D}" dt="2020-04-14T08:00:54.015" v="38" actId="571"/>
       <pc:docMkLst>
         <pc:docMk/>
       </pc:docMkLst>
       <pc:sldChg chg="addSp delSp modSp">
-        <pc:chgData name="杨 一楠" userId="da2026d27b215a28" providerId="LiveId" clId="{2D3360E4-A659-7247-A025-95E16156561D}" dt="2020-04-14T03:06:27.048" v="37" actId="1076"/>
+        <pc:chgData name="杨 一楠" userId="da2026d27b215a28" providerId="LiveId" clId="{2D3360E4-A659-7247-A025-95E16156561D}" dt="2020-04-14T08:00:54.015" v="38" actId="571"/>
         <pc:sldMkLst>
           <pc:docMk/>
           <pc:sldMk cId="2999099738" sldId="256"/>
@@ -176,6 +176,14 @@
             <pc:docMk/>
             <pc:sldMk cId="2999099738" sldId="256"/>
             <ac:grpSpMk id="18" creationId="{AED54497-2838-470B-9967-D8C970AFFC8C}"/>
+          </ac:grpSpMkLst>
+        </pc:grpChg>
+        <pc:grpChg chg="add mod">
+          <ac:chgData name="杨 一楠" userId="da2026d27b215a28" providerId="LiveId" clId="{2D3360E4-A659-7247-A025-95E16156561D}" dt="2020-04-14T08:00:54.015" v="38" actId="571"/>
+          <ac:grpSpMkLst>
+            <pc:docMk/>
+            <pc:sldMk cId="2999099738" sldId="256"/>
+            <ac:grpSpMk id="38" creationId="{CA8B50E1-67C1-5A40-A28E-DFEED45A0841}"/>
           </ac:grpSpMkLst>
         </pc:grpChg>
         <pc:picChg chg="mod">
@@ -12720,6 +12728,130 @@
           </a:p>
         </p:txBody>
       </p:sp>
+      <p:grpSp>
+        <p:nvGrpSpPr>
+          <p:cNvPr id="38" name="组合 37">
+            <a:extLst>
+              <a:ext uri="{FF2B5EF4-FFF2-40B4-BE49-F238E27FC236}">
+                <a16:creationId xmlns:a16="http://schemas.microsoft.com/office/drawing/2014/main" id="{CA8B50E1-67C1-5A40-A28E-DFEED45A0841}"/>
+              </a:ext>
+            </a:extLst>
+          </p:cNvPr>
+          <p:cNvGrpSpPr/>
+          <p:nvPr/>
+        </p:nvGrpSpPr>
+        <p:grpSpPr>
+          <a:xfrm>
+            <a:off x="10581730" y="5025245"/>
+            <a:ext cx="1013460" cy="1013460"/>
+            <a:chOff x="5173980" y="1402080"/>
+            <a:chExt cx="1013460" cy="1013460"/>
+          </a:xfrm>
+        </p:grpSpPr>
+        <p:sp>
+          <p:nvSpPr>
+            <p:cNvPr id="39" name="矩形: 圆角 24">
+              <a:extLst>
+                <a:ext uri="{FF2B5EF4-FFF2-40B4-BE49-F238E27FC236}">
+                  <a16:creationId xmlns:a16="http://schemas.microsoft.com/office/drawing/2014/main" id="{A98FDE0B-EC7D-1E42-A217-CB7B7EBED549}"/>
+                </a:ext>
+              </a:extLst>
+            </p:cNvPr>
+            <p:cNvSpPr/>
+            <p:nvPr/>
+          </p:nvSpPr>
+          <p:spPr>
+            <a:xfrm>
+              <a:off x="5173980" y="1402080"/>
+              <a:ext cx="1013460" cy="1013460"/>
+            </a:xfrm>
+            <a:prstGeom prst="roundRect">
+              <a:avLst/>
+            </a:prstGeom>
+          </p:spPr>
+          <p:style>
+            <a:lnRef idx="1">
+              <a:schemeClr val="accent2"/>
+            </a:lnRef>
+            <a:fillRef idx="3">
+              <a:schemeClr val="accent2"/>
+            </a:fillRef>
+            <a:effectRef idx="2">
+              <a:schemeClr val="accent2"/>
+            </a:effectRef>
+            <a:fontRef idx="minor">
+              <a:schemeClr val="lt1"/>
+            </a:fontRef>
+          </p:style>
+          <p:txBody>
+            <a:bodyPr rtlCol="0" anchor="ctr"/>
+            <a:lstStyle/>
+            <a:p>
+              <a:pPr algn="ctr"/>
+              <a:endParaRPr lang="zh-CN" altLang="en-US"/>
+            </a:p>
+          </p:txBody>
+        </p:sp>
+        <p:sp>
+          <p:nvSpPr>
+            <p:cNvPr id="40" name="文本框 39">
+              <a:extLst>
+                <a:ext uri="{FF2B5EF4-FFF2-40B4-BE49-F238E27FC236}">
+                  <a16:creationId xmlns:a16="http://schemas.microsoft.com/office/drawing/2014/main" id="{0712D111-54E3-DB49-B9EC-87C713137422}"/>
+                </a:ext>
+              </a:extLst>
+            </p:cNvPr>
+            <p:cNvSpPr txBox="1"/>
+            <p:nvPr/>
+          </p:nvSpPr>
+          <p:spPr>
+            <a:xfrm>
+              <a:off x="5273040" y="1676400"/>
+              <a:ext cx="815340" cy="369332"/>
+            </a:xfrm>
+            <a:prstGeom prst="rect">
+              <a:avLst/>
+            </a:prstGeom>
+            <a:noFill/>
+          </p:spPr>
+          <p:txBody>
+            <a:bodyPr wrap="square" rtlCol="0">
+              <a:spAutoFit/>
+            </a:bodyPr>
+            <a:lstStyle>
+              <a:defPPr>
+                <a:defRPr lang="zh-CN"/>
+              </a:defPPr>
+              <a:lvl1pPr algn="ctr">
+                <a:defRPr>
+                  <a:solidFill>
+                    <a:schemeClr val="bg1"/>
+                  </a:solidFill>
+                  <a:effectLst>
+                    <a:outerShdw blurRad="38100" dist="38100" dir="2700000" algn="tl">
+                      <a:srgbClr val="000000">
+                        <a:alpha val="43137"/>
+                      </a:srgbClr>
+                    </a:outerShdw>
+                  </a:effectLst>
+                  <a:latin typeface="Berlin Sans FB" panose="020E0602020502020306" pitchFamily="34" charset="0"/>
+                </a:defRPr>
+              </a:lvl1pPr>
+            </a:lstStyle>
+            <a:p>
+              <a:r>
+                <a:rPr lang="en-GB" altLang="zh-CN" dirty="0">
+                  <a:effectLst/>
+                </a:rPr>
+                <a:t>Close</a:t>
+              </a:r>
+              <a:endParaRPr lang="zh-CN" altLang="en-US" dirty="0">
+                <a:effectLst/>
+              </a:endParaRPr>
+            </a:p>
+          </p:txBody>
+        </p:sp>
+      </p:grpSp>
     </p:spTree>
     <p:extLst>
       <p:ext uri="{BB962C8B-B14F-4D97-AF65-F5344CB8AC3E}">

</xml_diff>

<commit_message>
modified:   README.md 	modified:   desktop_app/management_dashboard/data.pde 	modified:   desktop_app/management_dashboard/interface_prototype.pptx 	modified:   desktop_app/management_dashboard/management_dashboard.pde 	modified:   desktop_app/management_dashboard/view.pde
</commit_message>
<xml_diff>
--- a/desktop_app/management_dashboard/interface_prototype.pptx
+++ b/desktop_app/management_dashboard/interface_prototype.pptx
@@ -128,12 +128,12 @@
   <pc:docChgLst>
     <pc:chgData name="杨 一楠" userId="da2026d27b215a28" providerId="LiveId" clId="{2D3360E4-A659-7247-A025-95E16156561D}"/>
     <pc:docChg chg="undo custSel modSld">
-      <pc:chgData name="杨 一楠" userId="da2026d27b215a28" providerId="LiveId" clId="{2D3360E4-A659-7247-A025-95E16156561D}" dt="2020-04-14T08:00:54.015" v="38" actId="571"/>
+      <pc:chgData name="杨 一楠" userId="da2026d27b215a28" providerId="LiveId" clId="{2D3360E4-A659-7247-A025-95E16156561D}" dt="2020-04-25T03:51:43.294" v="39" actId="14734"/>
       <pc:docMkLst>
         <pc:docMk/>
       </pc:docMkLst>
       <pc:sldChg chg="addSp delSp modSp">
-        <pc:chgData name="杨 一楠" userId="da2026d27b215a28" providerId="LiveId" clId="{2D3360E4-A659-7247-A025-95E16156561D}" dt="2020-04-14T08:00:54.015" v="38" actId="571"/>
+        <pc:chgData name="杨 一楠" userId="da2026d27b215a28" providerId="LiveId" clId="{2D3360E4-A659-7247-A025-95E16156561D}" dt="2020-04-25T03:51:43.294" v="39" actId="14734"/>
         <pc:sldMkLst>
           <pc:docMk/>
           <pc:sldMk cId="2999099738" sldId="256"/>
@@ -186,6 +186,14 @@
             <ac:grpSpMk id="38" creationId="{CA8B50E1-67C1-5A40-A28E-DFEED45A0841}"/>
           </ac:grpSpMkLst>
         </pc:grpChg>
+        <pc:graphicFrameChg chg="modGraphic">
+          <ac:chgData name="杨 一楠" userId="da2026d27b215a28" providerId="LiveId" clId="{2D3360E4-A659-7247-A025-95E16156561D}" dt="2020-04-25T03:51:43.294" v="39" actId="14734"/>
+          <ac:graphicFrameMkLst>
+            <pc:docMk/>
+            <pc:sldMk cId="2999099738" sldId="256"/>
+            <ac:graphicFrameMk id="29" creationId="{E216AB69-A75C-41E8-8A03-77D21FD1DC35}"/>
+          </ac:graphicFrameMkLst>
+        </pc:graphicFrameChg>
         <pc:picChg chg="mod">
           <ac:chgData name="杨 一楠" userId="da2026d27b215a28" providerId="LiveId" clId="{2D3360E4-A659-7247-A025-95E16156561D}" dt="2020-04-14T02:19:31.348" v="33" actId="1076"/>
           <ac:picMkLst>
@@ -6479,7 +6487,7 @@
           <a:p>
             <a:fld id="{0C9F309C-C2C7-4D12-B91F-304C479FCDAF}" type="datetimeFigureOut">
               <a:rPr lang="zh-CN" altLang="en-US" smtClean="0"/>
-              <a:t>2020/4/14</a:t>
+              <a:t>2020/4/25</a:t>
             </a:fld>
             <a:endParaRPr lang="zh-CN" altLang="en-US"/>
           </a:p>
@@ -6677,7 +6685,7 @@
           <a:p>
             <a:fld id="{0C9F309C-C2C7-4D12-B91F-304C479FCDAF}" type="datetimeFigureOut">
               <a:rPr lang="zh-CN" altLang="en-US" smtClean="0"/>
-              <a:t>2020/4/14</a:t>
+              <a:t>2020/4/25</a:t>
             </a:fld>
             <a:endParaRPr lang="zh-CN" altLang="en-US"/>
           </a:p>
@@ -6885,7 +6893,7 @@
           <a:p>
             <a:fld id="{0C9F309C-C2C7-4D12-B91F-304C479FCDAF}" type="datetimeFigureOut">
               <a:rPr lang="zh-CN" altLang="en-US" smtClean="0"/>
-              <a:t>2020/4/14</a:t>
+              <a:t>2020/4/25</a:t>
             </a:fld>
             <a:endParaRPr lang="zh-CN" altLang="en-US"/>
           </a:p>
@@ -7083,7 +7091,7 @@
           <a:p>
             <a:fld id="{0C9F309C-C2C7-4D12-B91F-304C479FCDAF}" type="datetimeFigureOut">
               <a:rPr lang="zh-CN" altLang="en-US" smtClean="0"/>
-              <a:t>2020/4/14</a:t>
+              <a:t>2020/4/25</a:t>
             </a:fld>
             <a:endParaRPr lang="zh-CN" altLang="en-US"/>
           </a:p>
@@ -7358,7 +7366,7 @@
           <a:p>
             <a:fld id="{0C9F309C-C2C7-4D12-B91F-304C479FCDAF}" type="datetimeFigureOut">
               <a:rPr lang="zh-CN" altLang="en-US" smtClean="0"/>
-              <a:t>2020/4/14</a:t>
+              <a:t>2020/4/25</a:t>
             </a:fld>
             <a:endParaRPr lang="zh-CN" altLang="en-US"/>
           </a:p>
@@ -7623,7 +7631,7 @@
           <a:p>
             <a:fld id="{0C9F309C-C2C7-4D12-B91F-304C479FCDAF}" type="datetimeFigureOut">
               <a:rPr lang="zh-CN" altLang="en-US" smtClean="0"/>
-              <a:t>2020/4/14</a:t>
+              <a:t>2020/4/25</a:t>
             </a:fld>
             <a:endParaRPr lang="zh-CN" altLang="en-US"/>
           </a:p>
@@ -8035,7 +8043,7 @@
           <a:p>
             <a:fld id="{0C9F309C-C2C7-4D12-B91F-304C479FCDAF}" type="datetimeFigureOut">
               <a:rPr lang="zh-CN" altLang="en-US" smtClean="0"/>
-              <a:t>2020/4/14</a:t>
+              <a:t>2020/4/25</a:t>
             </a:fld>
             <a:endParaRPr lang="zh-CN" altLang="en-US"/>
           </a:p>
@@ -8176,7 +8184,7 @@
           <a:p>
             <a:fld id="{0C9F309C-C2C7-4D12-B91F-304C479FCDAF}" type="datetimeFigureOut">
               <a:rPr lang="zh-CN" altLang="en-US" smtClean="0"/>
-              <a:t>2020/4/14</a:t>
+              <a:t>2020/4/25</a:t>
             </a:fld>
             <a:endParaRPr lang="zh-CN" altLang="en-US"/>
           </a:p>
@@ -8289,7 +8297,7 @@
           <a:p>
             <a:fld id="{0C9F309C-C2C7-4D12-B91F-304C479FCDAF}" type="datetimeFigureOut">
               <a:rPr lang="zh-CN" altLang="en-US" smtClean="0"/>
-              <a:t>2020/4/14</a:t>
+              <a:t>2020/4/25</a:t>
             </a:fld>
             <a:endParaRPr lang="zh-CN" altLang="en-US"/>
           </a:p>
@@ -8600,7 +8608,7 @@
           <a:p>
             <a:fld id="{0C9F309C-C2C7-4D12-B91F-304C479FCDAF}" type="datetimeFigureOut">
               <a:rPr lang="zh-CN" altLang="en-US" smtClean="0"/>
-              <a:t>2020/4/14</a:t>
+              <a:t>2020/4/25</a:t>
             </a:fld>
             <a:endParaRPr lang="zh-CN" altLang="en-US"/>
           </a:p>
@@ -8888,7 +8896,7 @@
           <a:p>
             <a:fld id="{0C9F309C-C2C7-4D12-B91F-304C479FCDAF}" type="datetimeFigureOut">
               <a:rPr lang="zh-CN" altLang="en-US" smtClean="0"/>
-              <a:t>2020/4/14</a:t>
+              <a:t>2020/4/25</a:t>
             </a:fld>
             <a:endParaRPr lang="zh-CN" altLang="en-US"/>
           </a:p>
@@ -9129,7 +9137,7 @@
           <a:p>
             <a:fld id="{0C9F309C-C2C7-4D12-B91F-304C479FCDAF}" type="datetimeFigureOut">
               <a:rPr lang="zh-CN" altLang="en-US" smtClean="0"/>
-              <a:t>2020/4/14</a:t>
+              <a:t>2020/4/25</a:t>
             </a:fld>
             <a:endParaRPr lang="zh-CN" altLang="en-US"/>
           </a:p>
@@ -10296,14 +10304,14 @@
           <p:nvPr>
             <p:extLst>
               <p:ext uri="{D42A27DB-BD31-4B8C-83A1-F6EECF244321}">
-                <p14:modId xmlns:p14="http://schemas.microsoft.com/office/powerpoint/2010/main" val="1186030798"/>
+                <p14:modId xmlns:p14="http://schemas.microsoft.com/office/powerpoint/2010/main" val="3659024749"/>
               </p:ext>
             </p:extLst>
           </p:nvPr>
         </p:nvGraphicFramePr>
         <p:xfrm>
           <a:off x="8755380" y="1254430"/>
-          <a:ext cx="3348000" cy="3210889"/>
+          <a:ext cx="2975268" cy="3210889"/>
         </p:xfrm>
         <a:graphic>
           <a:graphicData uri="http://schemas.openxmlformats.org/drawingml/2006/table">
@@ -10312,7 +10320,7 @@
                 <a:tableStyleId>{5C22544A-7EE6-4342-B048-85BDC9FD1C3A}</a:tableStyleId>
               </a:tblPr>
               <a:tblGrid>
-                <a:gridCol w="1116000">
+                <a:gridCol w="743268">
                   <a:extLst>
                     <a:ext uri="{9D8B030D-6E8A-4147-A177-3AD203B41FA5}">
                       <a16:colId xmlns:a16="http://schemas.microsoft.com/office/drawing/2014/main" val="877036097"/>

</xml_diff>